<commit_message>
Additions to PowerPoint presentation
</commit_message>
<xml_diff>
--- a/Documentation/DevOps Fundamental PowerPoint.pptx
+++ b/Documentation/DevOps Fundamental PowerPoint.pptx
@@ -9,7 +9,11 @@
     <p:sldId id="257" r:id="rId3"/>
     <p:sldId id="258" r:id="rId4"/>
     <p:sldId id="259" r:id="rId5"/>
-    <p:sldId id="260" r:id="rId6"/>
+    <p:sldId id="264" r:id="rId6"/>
+    <p:sldId id="260" r:id="rId7"/>
+    <p:sldId id="261" r:id="rId8"/>
+    <p:sldId id="262" r:id="rId9"/>
+    <p:sldId id="263" r:id="rId10"/>
   </p:sldIdLst>
   <p:sldSz cx="12192000" cy="6858000"/>
   <p:notesSz cx="6858000" cy="9144000"/>
@@ -108,6 +112,11 @@
       </a:defRPr>
     </a:lvl9pPr>
   </p:defaultTextStyle>
+  <p:extLst>
+    <p:ext uri="{EFAFB233-063F-42B5-8137-9DF3F51BA10A}">
+      <p15:sldGuideLst xmlns:p15="http://schemas.microsoft.com/office/powerpoint/2012/main"/>
+    </p:ext>
+  </p:extLst>
 </p:presentation>
 </file>
 
@@ -2220,6 +2229,344 @@
             <a:pPr algn="ctr"/>
             <a:r>
               <a:rPr lang="en-GB" sz="5400" dirty="0"/>
+              <a:t>Ideas for a CRUD application</a:t>
+            </a:r>
+          </a:p>
+        </p:txBody>
+      </p:sp>
+      <p:sp>
+        <p:nvSpPr>
+          <p:cNvPr id="11" name="TextBox 10">
+            <a:extLst>
+              <a:ext uri="{FF2B5EF4-FFF2-40B4-BE49-F238E27FC236}">
+                <a16:creationId xmlns:a16="http://schemas.microsoft.com/office/drawing/2014/main" id="{A85B2AE7-7B9C-4E39-AAA3-11198B187B65}"/>
+              </a:ext>
+            </a:extLst>
+          </p:cNvPr>
+          <p:cNvSpPr txBox="1"/>
+          <p:nvPr/>
+        </p:nvSpPr>
+        <p:spPr>
+          <a:xfrm>
+            <a:off x="798021" y="1635646"/>
+            <a:ext cx="11055927" cy="2031325"/>
+          </a:xfrm>
+          <a:prstGeom prst="rect">
+            <a:avLst/>
+          </a:prstGeom>
+          <a:noFill/>
+        </p:spPr>
+        <p:txBody>
+          <a:bodyPr wrap="square" rtlCol="0">
+            <a:spAutoFit/>
+          </a:bodyPr>
+          <a:lstStyle/>
+          <a:p>
+            <a:pPr marL="285750" indent="-285750">
+              <a:buFont typeface="Wingdings" panose="05000000000000000000" pitchFamily="2" charset="2"/>
+              <a:buChar char="§"/>
+            </a:pPr>
+            <a:r>
+              <a:rPr lang="en-GB" dirty="0"/>
+              <a:t>Artwork Sharing App – Share artwork around the world that interests you</a:t>
+            </a:r>
+          </a:p>
+          <a:p>
+            <a:pPr marL="285750" indent="-285750">
+              <a:buFont typeface="Wingdings" panose="05000000000000000000" pitchFamily="2" charset="2"/>
+              <a:buChar char="§"/>
+            </a:pPr>
+            <a:r>
+              <a:rPr lang="en-GB" dirty="0"/>
+              <a:t>Fishing Location/Spots App – Share your individual catches, showcase your best catches to the world</a:t>
+            </a:r>
+          </a:p>
+          <a:p>
+            <a:pPr marL="285750" indent="-285750">
+              <a:buFont typeface="Wingdings" panose="05000000000000000000" pitchFamily="2" charset="2"/>
+              <a:buChar char="§"/>
+            </a:pPr>
+            <a:r>
+              <a:rPr lang="en-GB" dirty="0"/>
+              <a:t>Recipe Sharing App – Share your individual recipes, rate others’ recipes, showcase the most highly rated recipes for each category/style of food</a:t>
+            </a:r>
+          </a:p>
+          <a:p>
+            <a:pPr marL="285750" indent="-285750">
+              <a:buFont typeface="Wingdings" panose="05000000000000000000" pitchFamily="2" charset="2"/>
+              <a:buChar char="§"/>
+            </a:pPr>
+            <a:r>
+              <a:rPr lang="en-GB" dirty="0"/>
+              <a:t>Fake Society – Create profiles of virtual fictional beings, with various occupations and highly detailed information</a:t>
+            </a:r>
+          </a:p>
+          <a:p>
+            <a:pPr marL="285750" indent="-285750">
+              <a:buFont typeface="Wingdings" panose="05000000000000000000" pitchFamily="2" charset="2"/>
+              <a:buChar char="§"/>
+            </a:pPr>
+            <a:endParaRPr lang="en-GB" dirty="0"/>
+          </a:p>
+          <a:p>
+            <a:pPr marL="285750" indent="-285750">
+              <a:buFont typeface="Wingdings" panose="05000000000000000000" pitchFamily="2" charset="2"/>
+              <a:buChar char="§"/>
+            </a:pPr>
+            <a:endParaRPr lang="en-GB" dirty="0"/>
+          </a:p>
+        </p:txBody>
+      </p:sp>
+      <p:sp>
+        <p:nvSpPr>
+          <p:cNvPr id="5" name="Title 1">
+            <a:extLst>
+              <a:ext uri="{FF2B5EF4-FFF2-40B4-BE49-F238E27FC236}">
+                <a16:creationId xmlns:a16="http://schemas.microsoft.com/office/drawing/2014/main" id="{DB808B8C-33C7-434C-957C-230E9DFEF8E5}"/>
+              </a:ext>
+            </a:extLst>
+          </p:cNvPr>
+          <p:cNvSpPr txBox="1">
+            <a:spLocks/>
+          </p:cNvSpPr>
+          <p:nvPr/>
+        </p:nvSpPr>
+        <p:spPr>
+          <a:xfrm>
+            <a:off x="0" y="2938669"/>
+            <a:ext cx="12192000" cy="980661"/>
+          </a:xfrm>
+          <a:prstGeom prst="rect">
+            <a:avLst/>
+          </a:prstGeom>
+        </p:spPr>
+        <p:txBody>
+          <a:bodyPr vert="horz" lIns="91440" tIns="45720" rIns="91440" bIns="45720" rtlCol="0" anchor="b">
+            <a:noAutofit/>
+          </a:bodyPr>
+          <a:lstStyle>
+            <a:lvl1pPr algn="l" defTabSz="914400" rtl="0" eaLnBrk="1" latinLnBrk="0" hangingPunct="1">
+              <a:lnSpc>
+                <a:spcPct val="90000"/>
+              </a:lnSpc>
+              <a:spcBef>
+                <a:spcPct val="0"/>
+              </a:spcBef>
+              <a:buNone/>
+              <a:defRPr sz="8000" kern="1200" spc="-50" baseline="0">
+                <a:solidFill>
+                  <a:schemeClr val="tx1">
+                    <a:lumMod val="85000"/>
+                    <a:lumOff val="15000"/>
+                  </a:schemeClr>
+                </a:solidFill>
+                <a:latin typeface="+mj-lt"/>
+                <a:ea typeface="+mj-ea"/>
+                <a:cs typeface="+mj-cs"/>
+              </a:defRPr>
+            </a:lvl1pPr>
+          </a:lstStyle>
+          <a:p>
+            <a:pPr algn="ctr"/>
+            <a:r>
+              <a:rPr lang="en-GB" sz="4400" dirty="0"/>
+              <a:t>Chosen Idea: Fishing App</a:t>
+            </a:r>
+          </a:p>
+        </p:txBody>
+      </p:sp>
+      <p:sp>
+        <p:nvSpPr>
+          <p:cNvPr id="7" name="TextBox 6">
+            <a:extLst>
+              <a:ext uri="{FF2B5EF4-FFF2-40B4-BE49-F238E27FC236}">
+                <a16:creationId xmlns:a16="http://schemas.microsoft.com/office/drawing/2014/main" id="{2D12C24B-72C8-4EC1-9D85-1ED2D5DC8B84}"/>
+              </a:ext>
+            </a:extLst>
+          </p:cNvPr>
+          <p:cNvSpPr txBox="1"/>
+          <p:nvPr/>
+        </p:nvSpPr>
+        <p:spPr>
+          <a:xfrm>
+            <a:off x="798020" y="4068191"/>
+            <a:ext cx="11055927" cy="2862322"/>
+          </a:xfrm>
+          <a:prstGeom prst="rect">
+            <a:avLst/>
+          </a:prstGeom>
+          <a:noFill/>
+        </p:spPr>
+        <p:txBody>
+          <a:bodyPr wrap="square" rtlCol="0">
+            <a:spAutoFit/>
+          </a:bodyPr>
+          <a:lstStyle/>
+          <a:p>
+            <a:r>
+              <a:rPr lang="en-GB" dirty="0"/>
+              <a:t>Reasoning for choice: Fishing is an activity which has been enjoyed for thousands of years throughout all eras of our society. There is marketability in such an idea and also a high level of personal interest within the subject.</a:t>
+            </a:r>
+          </a:p>
+          <a:p>
+            <a:endParaRPr lang="en-GB" dirty="0"/>
+          </a:p>
+          <a:p>
+            <a:r>
+              <a:rPr lang="en-GB" dirty="0"/>
+              <a:t>I believe that a fishing app can very easily satisfy the MVP requirements of the project and more, whilst producing a marketable, expandable application that many around the world could find useful and/or rewarding. I also believe that as I have a good interest in fishing that this subject area can prove as  a fun and challenging platform to showcase my current skillset attained from the QA Academy.</a:t>
+            </a:r>
+          </a:p>
+          <a:p>
+            <a:endParaRPr lang="en-GB" dirty="0"/>
+          </a:p>
+          <a:p>
+            <a:endParaRPr lang="en-GB" dirty="0"/>
+          </a:p>
+          <a:p>
+            <a:pPr marL="285750" indent="-285750">
+              <a:buFont typeface="Wingdings" panose="05000000000000000000" pitchFamily="2" charset="2"/>
+              <a:buChar char="§"/>
+            </a:pPr>
+            <a:endParaRPr lang="en-GB" dirty="0"/>
+          </a:p>
+        </p:txBody>
+      </p:sp>
+    </p:spTree>
+    <p:extLst>
+      <p:ext uri="{BB962C8B-B14F-4D97-AF65-F5344CB8AC3E}">
+        <p14:creationId xmlns:p14="http://schemas.microsoft.com/office/powerpoint/2010/main" val="2719860578"/>
+      </p:ext>
+    </p:extLst>
+  </p:cSld>
+  <p:clrMapOvr>
+    <a:masterClrMapping/>
+  </p:clrMapOvr>
+</p:sld>
+</file>
+
+<file path=ppt/slides/slide6.xml><?xml version="1.0" encoding="utf-8"?>
+<p:sld xmlns:a="http://schemas.openxmlformats.org/drawingml/2006/main" xmlns:r="http://schemas.openxmlformats.org/officeDocument/2006/relationships" xmlns:p="http://schemas.openxmlformats.org/presentationml/2006/main">
+  <p:cSld>
+    <p:spTree>
+      <p:nvGrpSpPr>
+        <p:cNvPr id="1" name=""/>
+        <p:cNvGrpSpPr/>
+        <p:nvPr/>
+      </p:nvGrpSpPr>
+      <p:grpSpPr>
+        <a:xfrm>
+          <a:off x="0" y="0"/>
+          <a:ext cx="0" cy="0"/>
+          <a:chOff x="0" y="0"/>
+          <a:chExt cx="0" cy="0"/>
+        </a:xfrm>
+      </p:grpSpPr>
+      <p:sp>
+        <p:nvSpPr>
+          <p:cNvPr id="12" name="Rectangle 11">
+            <a:extLst>
+              <a:ext uri="{FF2B5EF4-FFF2-40B4-BE49-F238E27FC236}">
+                <a16:creationId xmlns:a16="http://schemas.microsoft.com/office/drawing/2014/main" id="{5C3C75FD-3C39-45C7-9F84-35913E7DEF55}"/>
+              </a:ext>
+            </a:extLst>
+          </p:cNvPr>
+          <p:cNvSpPr/>
+          <p:nvPr/>
+        </p:nvSpPr>
+        <p:spPr>
+          <a:xfrm>
+            <a:off x="1080655" y="4321956"/>
+            <a:ext cx="10490661" cy="532677"/>
+          </a:xfrm>
+          <a:prstGeom prst="rect">
+            <a:avLst/>
+          </a:prstGeom>
+          <a:solidFill>
+            <a:schemeClr val="bg1"/>
+          </a:solidFill>
+          <a:ln>
+            <a:noFill/>
+          </a:ln>
+        </p:spPr>
+        <p:style>
+          <a:lnRef idx="2">
+            <a:schemeClr val="accent1">
+              <a:shade val="50000"/>
+            </a:schemeClr>
+          </a:lnRef>
+          <a:fillRef idx="1">
+            <a:schemeClr val="accent1"/>
+          </a:fillRef>
+          <a:effectRef idx="0">
+            <a:schemeClr val="accent1"/>
+          </a:effectRef>
+          <a:fontRef idx="minor">
+            <a:schemeClr val="lt1"/>
+          </a:fontRef>
+        </p:style>
+        <p:txBody>
+          <a:bodyPr rtlCol="0" anchor="ctr"/>
+          <a:lstStyle/>
+          <a:p>
+            <a:pPr algn="ctr"/>
+            <a:endParaRPr lang="en-GB"/>
+          </a:p>
+        </p:txBody>
+      </p:sp>
+      <p:sp>
+        <p:nvSpPr>
+          <p:cNvPr id="6" name="Title 1">
+            <a:extLst>
+              <a:ext uri="{FF2B5EF4-FFF2-40B4-BE49-F238E27FC236}">
+                <a16:creationId xmlns:a16="http://schemas.microsoft.com/office/drawing/2014/main" id="{A0D03195-CE19-4FBE-926F-5306EFF0BA97}"/>
+              </a:ext>
+            </a:extLst>
+          </p:cNvPr>
+          <p:cNvSpPr txBox="1">
+            <a:spLocks/>
+          </p:cNvSpPr>
+          <p:nvPr/>
+        </p:nvSpPr>
+        <p:spPr>
+          <a:xfrm>
+            <a:off x="0" y="0"/>
+            <a:ext cx="12192000" cy="980661"/>
+          </a:xfrm>
+          <a:prstGeom prst="rect">
+            <a:avLst/>
+          </a:prstGeom>
+        </p:spPr>
+        <p:txBody>
+          <a:bodyPr vert="horz" lIns="91440" tIns="45720" rIns="91440" bIns="45720" rtlCol="0" anchor="b">
+            <a:noAutofit/>
+          </a:bodyPr>
+          <a:lstStyle>
+            <a:lvl1pPr algn="l" defTabSz="914400" rtl="0" eaLnBrk="1" latinLnBrk="0" hangingPunct="1">
+              <a:lnSpc>
+                <a:spcPct val="90000"/>
+              </a:lnSpc>
+              <a:spcBef>
+                <a:spcPct val="0"/>
+              </a:spcBef>
+              <a:buNone/>
+              <a:defRPr sz="8000" kern="1200" spc="-50" baseline="0">
+                <a:solidFill>
+                  <a:schemeClr val="tx1">
+                    <a:lumMod val="85000"/>
+                    <a:lumOff val="15000"/>
+                  </a:schemeClr>
+                </a:solidFill>
+                <a:latin typeface="+mj-lt"/>
+                <a:ea typeface="+mj-ea"/>
+                <a:cs typeface="+mj-cs"/>
+              </a:defRPr>
+            </a:lvl1pPr>
+          </a:lstStyle>
+          <a:p>
+            <a:pPr algn="ctr"/>
+            <a:r>
+              <a:rPr lang="en-GB" sz="5400" dirty="0"/>
               <a:t>Idea- Fishing Locations/Spots</a:t>
             </a:r>
           </a:p>
@@ -2240,7 +2587,7 @@
         <p:spPr>
           <a:xfrm>
             <a:off x="798021" y="1161314"/>
-            <a:ext cx="11055927" cy="4524315"/>
+            <a:ext cx="11055927" cy="5078313"/>
           </a:xfrm>
           <a:prstGeom prst="rect">
             <a:avLst/>
@@ -2280,7 +2627,7 @@
             </a:pPr>
             <a:r>
               <a:rPr lang="en-GB" dirty="0"/>
-              <a:t>User profiles - (Username, ID (Auto Generated on submission of form) Forename, Surname, Email, Region, Gear List (Optional),Top Catch (Fish Name, Fish Species (Optional), Fish Length, Fish Weight, Location of the fish).</a:t>
+              <a:t>User profiles - (Username, ID (Auto Generated on submission of form) , password , Forename, Surname, Email, Region, Gear List (Optional),Top Catch (Fish Name, Fish Species (Optional), Fish Length, Fish Weight, Location of the fish).</a:t>
             </a:r>
           </a:p>
           <a:p>
@@ -2303,7 +2650,7 @@
             </a:r>
             <a:r>
               <a:rPr lang="en-GB" dirty="0"/>
-              <a:t>Users are able to view the catch diary and search for any catches that are assigned to their ID, shown on their profile once it is created.</a:t>
+              <a:t>Users are able to view the catch diary and search for any catches that are assigned to their ID, shown on their profile once it is created. Users are also able to view the Fish log, which shows the average, min and max length/weight of a given fish and the username of whoever caught the fish.</a:t>
             </a:r>
           </a:p>
           <a:p>
@@ -2339,6 +2686,1740 @@
     <p:extLst>
       <p:ext uri="{BB962C8B-B14F-4D97-AF65-F5344CB8AC3E}">
         <p14:creationId xmlns:p14="http://schemas.microsoft.com/office/powerpoint/2010/main" val="2158811481"/>
+      </p:ext>
+    </p:extLst>
+  </p:cSld>
+  <p:clrMapOvr>
+    <a:masterClrMapping/>
+  </p:clrMapOvr>
+</p:sld>
+</file>
+
+<file path=ppt/slides/slide7.xml><?xml version="1.0" encoding="utf-8"?>
+<p:sld xmlns:a="http://schemas.openxmlformats.org/drawingml/2006/main" xmlns:r="http://schemas.openxmlformats.org/officeDocument/2006/relationships" xmlns:p="http://schemas.openxmlformats.org/presentationml/2006/main">
+  <p:cSld>
+    <p:spTree>
+      <p:nvGrpSpPr>
+        <p:cNvPr id="1" name=""/>
+        <p:cNvGrpSpPr/>
+        <p:nvPr/>
+      </p:nvGrpSpPr>
+      <p:grpSpPr>
+        <a:xfrm>
+          <a:off x="0" y="0"/>
+          <a:ext cx="0" cy="0"/>
+          <a:chOff x="0" y="0"/>
+          <a:chExt cx="0" cy="0"/>
+        </a:xfrm>
+      </p:grpSpPr>
+      <p:sp>
+        <p:nvSpPr>
+          <p:cNvPr id="4" name="Rectangle 3">
+            <a:extLst>
+              <a:ext uri="{FF2B5EF4-FFF2-40B4-BE49-F238E27FC236}">
+                <a16:creationId xmlns:a16="http://schemas.microsoft.com/office/drawing/2014/main" id="{2331138C-8445-49D2-9918-C0A371AA1E8A}"/>
+              </a:ext>
+            </a:extLst>
+          </p:cNvPr>
+          <p:cNvSpPr/>
+          <p:nvPr/>
+        </p:nvSpPr>
+        <p:spPr>
+          <a:xfrm>
+            <a:off x="1113905" y="4256116"/>
+            <a:ext cx="10523913" cy="1080655"/>
+          </a:xfrm>
+          <a:prstGeom prst="rect">
+            <a:avLst/>
+          </a:prstGeom>
+          <a:solidFill>
+            <a:schemeClr val="bg1"/>
+          </a:solidFill>
+          <a:ln>
+            <a:noFill/>
+          </a:ln>
+        </p:spPr>
+        <p:style>
+          <a:lnRef idx="2">
+            <a:schemeClr val="accent1">
+              <a:shade val="50000"/>
+            </a:schemeClr>
+          </a:lnRef>
+          <a:fillRef idx="1">
+            <a:schemeClr val="accent1"/>
+          </a:fillRef>
+          <a:effectRef idx="0">
+            <a:schemeClr val="accent1"/>
+          </a:effectRef>
+          <a:fontRef idx="minor">
+            <a:schemeClr val="lt1"/>
+          </a:fontRef>
+        </p:style>
+        <p:txBody>
+          <a:bodyPr rtlCol="0" anchor="ctr"/>
+          <a:lstStyle/>
+          <a:p>
+            <a:pPr algn="ctr"/>
+            <a:endParaRPr lang="en-GB"/>
+          </a:p>
+        </p:txBody>
+      </p:sp>
+      <p:sp>
+        <p:nvSpPr>
+          <p:cNvPr id="5" name="Title 1">
+            <a:extLst>
+              <a:ext uri="{FF2B5EF4-FFF2-40B4-BE49-F238E27FC236}">
+                <a16:creationId xmlns:a16="http://schemas.microsoft.com/office/drawing/2014/main" id="{CC0FD41E-36EA-437E-A1C4-36C447BD7B63}"/>
+              </a:ext>
+            </a:extLst>
+          </p:cNvPr>
+          <p:cNvSpPr txBox="1">
+            <a:spLocks/>
+          </p:cNvSpPr>
+          <p:nvPr/>
+        </p:nvSpPr>
+        <p:spPr>
+          <a:xfrm>
+            <a:off x="0" y="-13252"/>
+            <a:ext cx="12192000" cy="980661"/>
+          </a:xfrm>
+          <a:prstGeom prst="rect">
+            <a:avLst/>
+          </a:prstGeom>
+        </p:spPr>
+        <p:txBody>
+          <a:bodyPr vert="horz" lIns="91440" tIns="45720" rIns="91440" bIns="45720" rtlCol="0" anchor="b">
+            <a:noAutofit/>
+          </a:bodyPr>
+          <a:lstStyle>
+            <a:lvl1pPr algn="l" defTabSz="914400" rtl="0" eaLnBrk="1" latinLnBrk="0" hangingPunct="1">
+              <a:lnSpc>
+                <a:spcPct val="90000"/>
+              </a:lnSpc>
+              <a:spcBef>
+                <a:spcPct val="0"/>
+              </a:spcBef>
+              <a:buNone/>
+              <a:defRPr sz="8000" kern="1200" spc="-50" baseline="0">
+                <a:solidFill>
+                  <a:schemeClr val="tx1">
+                    <a:lumMod val="85000"/>
+                    <a:lumOff val="15000"/>
+                  </a:schemeClr>
+                </a:solidFill>
+                <a:latin typeface="+mj-lt"/>
+                <a:ea typeface="+mj-ea"/>
+                <a:cs typeface="+mj-cs"/>
+              </a:defRPr>
+            </a:lvl1pPr>
+          </a:lstStyle>
+          <a:p>
+            <a:pPr algn="ctr"/>
+            <a:r>
+              <a:rPr lang="en-GB" sz="5400" dirty="0"/>
+              <a:t>Idea- Cont.</a:t>
+            </a:r>
+          </a:p>
+        </p:txBody>
+      </p:sp>
+      <p:sp>
+        <p:nvSpPr>
+          <p:cNvPr id="7" name="TextBox 6">
+            <a:extLst>
+              <a:ext uri="{FF2B5EF4-FFF2-40B4-BE49-F238E27FC236}">
+                <a16:creationId xmlns:a16="http://schemas.microsoft.com/office/drawing/2014/main" id="{862CC271-BF34-4818-B224-222139ED75BC}"/>
+              </a:ext>
+            </a:extLst>
+          </p:cNvPr>
+          <p:cNvSpPr txBox="1"/>
+          <p:nvPr/>
+        </p:nvSpPr>
+        <p:spPr>
+          <a:xfrm>
+            <a:off x="3359424" y="938543"/>
+            <a:ext cx="5473148" cy="830997"/>
+          </a:xfrm>
+          <a:prstGeom prst="rect">
+            <a:avLst/>
+          </a:prstGeom>
+          <a:noFill/>
+        </p:spPr>
+        <p:txBody>
+          <a:bodyPr wrap="square" rtlCol="0">
+            <a:spAutoFit/>
+          </a:bodyPr>
+          <a:lstStyle/>
+          <a:p>
+            <a:pPr algn="ctr"/>
+            <a:r>
+              <a:rPr lang="en-GB" sz="2400" u="sng" dirty="0"/>
+              <a:t>Initial Tables/Data Structure (No relationships yet)</a:t>
+            </a:r>
+            <a:endParaRPr lang="en-GB" sz="1600" u="sng" dirty="0"/>
+          </a:p>
+        </p:txBody>
+      </p:sp>
+      <p:graphicFrame>
+        <p:nvGraphicFramePr>
+          <p:cNvPr id="9" name="Table 9">
+            <a:extLst>
+              <a:ext uri="{FF2B5EF4-FFF2-40B4-BE49-F238E27FC236}">
+                <a16:creationId xmlns:a16="http://schemas.microsoft.com/office/drawing/2014/main" id="{A2FBE404-4CA8-495B-85D4-EDE5D28868FD}"/>
+              </a:ext>
+            </a:extLst>
+          </p:cNvPr>
+          <p:cNvGraphicFramePr>
+            <a:graphicFrameLocks noGrp="1"/>
+          </p:cNvGraphicFramePr>
+          <p:nvPr>
+            <p:extLst>
+              <p:ext uri="{D42A27DB-BD31-4B8C-83A1-F6EECF244321}">
+                <p14:modId xmlns:p14="http://schemas.microsoft.com/office/powerpoint/2010/main" val="2110583935"/>
+              </p:ext>
+            </p:extLst>
+          </p:nvPr>
+        </p:nvGraphicFramePr>
+        <p:xfrm>
+          <a:off x="1125404" y="2587336"/>
+          <a:ext cx="2036417" cy="3708400"/>
+        </p:xfrm>
+        <a:graphic>
+          <a:graphicData uri="http://schemas.openxmlformats.org/drawingml/2006/table">
+            <a:tbl>
+              <a:tblPr firstRow="1" bandRow="1">
+                <a:tableStyleId>{073A0DAA-6AF3-43AB-8588-CEC1D06C72B9}</a:tableStyleId>
+              </a:tblPr>
+              <a:tblGrid>
+                <a:gridCol w="2036417">
+                  <a:extLst>
+                    <a:ext uri="{9D8B030D-6E8A-4147-A177-3AD203B41FA5}">
+                      <a16:colId xmlns:a16="http://schemas.microsoft.com/office/drawing/2014/main" val="1286531651"/>
+                    </a:ext>
+                  </a:extLst>
+                </a:gridCol>
+              </a:tblGrid>
+              <a:tr h="370840">
+                <a:tc>
+                  <a:txBody>
+                    <a:bodyPr/>
+                    <a:lstStyle/>
+                    <a:p>
+                      <a:pPr algn="ctr"/>
+                      <a:r>
+                        <a:rPr lang="en-GB" dirty="0"/>
+                        <a:t>User</a:t>
+                      </a:r>
+                    </a:p>
+                  </a:txBody>
+                  <a:tcPr/>
+                </a:tc>
+                <a:extLst>
+                  <a:ext uri="{0D108BD9-81ED-4DB2-BD59-A6C34878D82A}">
+                    <a16:rowId xmlns:a16="http://schemas.microsoft.com/office/drawing/2014/main" val="1422129240"/>
+                  </a:ext>
+                </a:extLst>
+              </a:tr>
+              <a:tr h="370840">
+                <a:tc>
+                  <a:txBody>
+                    <a:bodyPr/>
+                    <a:lstStyle/>
+                    <a:p>
+                      <a:pPr algn="ctr"/>
+                      <a:r>
+                        <a:rPr lang="en-GB" dirty="0"/>
+                        <a:t>ID </a:t>
+                      </a:r>
+                      <a:r>
+                        <a:rPr lang="en-GB" dirty="0">
+                          <a:solidFill>
+                            <a:srgbClr val="FF0000"/>
+                          </a:solidFill>
+                        </a:rPr>
+                        <a:t>PK</a:t>
+                      </a:r>
+                    </a:p>
+                  </a:txBody>
+                  <a:tcPr/>
+                </a:tc>
+                <a:extLst>
+                  <a:ext uri="{0D108BD9-81ED-4DB2-BD59-A6C34878D82A}">
+                    <a16:rowId xmlns:a16="http://schemas.microsoft.com/office/drawing/2014/main" val="1188494543"/>
+                  </a:ext>
+                </a:extLst>
+              </a:tr>
+              <a:tr h="370840">
+                <a:tc>
+                  <a:txBody>
+                    <a:bodyPr/>
+                    <a:lstStyle/>
+                    <a:p>
+                      <a:pPr algn="ctr"/>
+                      <a:r>
+                        <a:rPr lang="en-GB" dirty="0">
+                          <a:solidFill>
+                            <a:schemeClr val="tx1"/>
+                          </a:solidFill>
+                        </a:rPr>
+                        <a:t>PASSWORD</a:t>
+                      </a:r>
+                    </a:p>
+                  </a:txBody>
+                  <a:tcPr/>
+                </a:tc>
+                <a:extLst>
+                  <a:ext uri="{0D108BD9-81ED-4DB2-BD59-A6C34878D82A}">
+                    <a16:rowId xmlns:a16="http://schemas.microsoft.com/office/drawing/2014/main" val="3745920006"/>
+                  </a:ext>
+                </a:extLst>
+              </a:tr>
+              <a:tr h="370840">
+                <a:tc>
+                  <a:txBody>
+                    <a:bodyPr/>
+                    <a:lstStyle/>
+                    <a:p>
+                      <a:pPr algn="ctr"/>
+                      <a:r>
+                        <a:rPr lang="en-GB" dirty="0"/>
+                        <a:t>FORENAME</a:t>
+                      </a:r>
+                    </a:p>
+                  </a:txBody>
+                  <a:tcPr/>
+                </a:tc>
+                <a:extLst>
+                  <a:ext uri="{0D108BD9-81ED-4DB2-BD59-A6C34878D82A}">
+                    <a16:rowId xmlns:a16="http://schemas.microsoft.com/office/drawing/2014/main" val="3216325975"/>
+                  </a:ext>
+                </a:extLst>
+              </a:tr>
+              <a:tr h="370840">
+                <a:tc>
+                  <a:txBody>
+                    <a:bodyPr/>
+                    <a:lstStyle/>
+                    <a:p>
+                      <a:pPr algn="ctr"/>
+                      <a:r>
+                        <a:rPr lang="en-GB" dirty="0"/>
+                        <a:t>SURNAME</a:t>
+                      </a:r>
+                    </a:p>
+                  </a:txBody>
+                  <a:tcPr/>
+                </a:tc>
+                <a:extLst>
+                  <a:ext uri="{0D108BD9-81ED-4DB2-BD59-A6C34878D82A}">
+                    <a16:rowId xmlns:a16="http://schemas.microsoft.com/office/drawing/2014/main" val="1097292389"/>
+                  </a:ext>
+                </a:extLst>
+              </a:tr>
+              <a:tr h="370840">
+                <a:tc>
+                  <a:txBody>
+                    <a:bodyPr/>
+                    <a:lstStyle/>
+                    <a:p>
+                      <a:pPr algn="ctr"/>
+                      <a:r>
+                        <a:rPr lang="en-GB" dirty="0"/>
+                        <a:t>USERNAME</a:t>
+                      </a:r>
+                    </a:p>
+                  </a:txBody>
+                  <a:tcPr/>
+                </a:tc>
+                <a:extLst>
+                  <a:ext uri="{0D108BD9-81ED-4DB2-BD59-A6C34878D82A}">
+                    <a16:rowId xmlns:a16="http://schemas.microsoft.com/office/drawing/2014/main" val="3595484442"/>
+                  </a:ext>
+                </a:extLst>
+              </a:tr>
+              <a:tr h="370840">
+                <a:tc>
+                  <a:txBody>
+                    <a:bodyPr/>
+                    <a:lstStyle/>
+                    <a:p>
+                      <a:pPr algn="ctr"/>
+                      <a:r>
+                        <a:rPr lang="en-GB" dirty="0"/>
+                        <a:t>EMAIL</a:t>
+                      </a:r>
+                    </a:p>
+                  </a:txBody>
+                  <a:tcPr/>
+                </a:tc>
+                <a:extLst>
+                  <a:ext uri="{0D108BD9-81ED-4DB2-BD59-A6C34878D82A}">
+                    <a16:rowId xmlns:a16="http://schemas.microsoft.com/office/drawing/2014/main" val="397360109"/>
+                  </a:ext>
+                </a:extLst>
+              </a:tr>
+              <a:tr h="370840">
+                <a:tc>
+                  <a:txBody>
+                    <a:bodyPr/>
+                    <a:lstStyle/>
+                    <a:p>
+                      <a:pPr algn="ctr"/>
+                      <a:r>
+                        <a:rPr lang="en-GB" dirty="0"/>
+                        <a:t>REGION</a:t>
+                      </a:r>
+                    </a:p>
+                  </a:txBody>
+                  <a:tcPr/>
+                </a:tc>
+                <a:extLst>
+                  <a:ext uri="{0D108BD9-81ED-4DB2-BD59-A6C34878D82A}">
+                    <a16:rowId xmlns:a16="http://schemas.microsoft.com/office/drawing/2014/main" val="91843410"/>
+                  </a:ext>
+                </a:extLst>
+              </a:tr>
+              <a:tr h="370840">
+                <a:tc>
+                  <a:txBody>
+                    <a:bodyPr/>
+                    <a:lstStyle/>
+                    <a:p>
+                      <a:pPr algn="ctr"/>
+                      <a:r>
+                        <a:rPr lang="en-GB" dirty="0"/>
+                        <a:t>GEAR*</a:t>
+                      </a:r>
+                    </a:p>
+                  </a:txBody>
+                  <a:tcPr/>
+                </a:tc>
+                <a:extLst>
+                  <a:ext uri="{0D108BD9-81ED-4DB2-BD59-A6C34878D82A}">
+                    <a16:rowId xmlns:a16="http://schemas.microsoft.com/office/drawing/2014/main" val="1143153181"/>
+                  </a:ext>
+                </a:extLst>
+              </a:tr>
+              <a:tr h="370840">
+                <a:tc>
+                  <a:txBody>
+                    <a:bodyPr/>
+                    <a:lstStyle/>
+                    <a:p>
+                      <a:pPr algn="ctr"/>
+                      <a:r>
+                        <a:rPr lang="en-GB" dirty="0"/>
+                        <a:t>TOP CATCH ID </a:t>
+                      </a:r>
+                      <a:r>
+                        <a:rPr lang="en-GB" dirty="0">
+                          <a:solidFill>
+                            <a:srgbClr val="FF0000"/>
+                          </a:solidFill>
+                        </a:rPr>
+                        <a:t>FK</a:t>
+                      </a:r>
+                    </a:p>
+                  </a:txBody>
+                  <a:tcPr/>
+                </a:tc>
+                <a:extLst>
+                  <a:ext uri="{0D108BD9-81ED-4DB2-BD59-A6C34878D82A}">
+                    <a16:rowId xmlns:a16="http://schemas.microsoft.com/office/drawing/2014/main" val="4224902186"/>
+                  </a:ext>
+                </a:extLst>
+              </a:tr>
+            </a:tbl>
+          </a:graphicData>
+        </a:graphic>
+      </p:graphicFrame>
+      <p:graphicFrame>
+        <p:nvGraphicFramePr>
+          <p:cNvPr id="11" name="Table 9">
+            <a:extLst>
+              <a:ext uri="{FF2B5EF4-FFF2-40B4-BE49-F238E27FC236}">
+                <a16:creationId xmlns:a16="http://schemas.microsoft.com/office/drawing/2014/main" id="{36A53E74-463D-4045-8D45-C5870CC36A45}"/>
+              </a:ext>
+            </a:extLst>
+          </p:cNvPr>
+          <p:cNvGraphicFramePr>
+            <a:graphicFrameLocks noGrp="1"/>
+          </p:cNvGraphicFramePr>
+          <p:nvPr>
+            <p:extLst>
+              <p:ext uri="{D42A27DB-BD31-4B8C-83A1-F6EECF244321}">
+                <p14:modId xmlns:p14="http://schemas.microsoft.com/office/powerpoint/2010/main" val="3120604281"/>
+              </p:ext>
+            </p:extLst>
+          </p:nvPr>
+        </p:nvGraphicFramePr>
+        <p:xfrm>
+          <a:off x="4357012" y="1906104"/>
+          <a:ext cx="3477973" cy="4450080"/>
+        </p:xfrm>
+        <a:graphic>
+          <a:graphicData uri="http://schemas.openxmlformats.org/drawingml/2006/table">
+            <a:tbl>
+              <a:tblPr firstRow="1" bandRow="1">
+                <a:tableStyleId>{073A0DAA-6AF3-43AB-8588-CEC1D06C72B9}</a:tableStyleId>
+              </a:tblPr>
+              <a:tblGrid>
+                <a:gridCol w="3477973">
+                  <a:extLst>
+                    <a:ext uri="{9D8B030D-6E8A-4147-A177-3AD203B41FA5}">
+                      <a16:colId xmlns:a16="http://schemas.microsoft.com/office/drawing/2014/main" val="1286531651"/>
+                    </a:ext>
+                  </a:extLst>
+                </a:gridCol>
+              </a:tblGrid>
+              <a:tr h="370840">
+                <a:tc>
+                  <a:txBody>
+                    <a:bodyPr/>
+                    <a:lstStyle/>
+                    <a:p>
+                      <a:pPr algn="ctr"/>
+                      <a:r>
+                        <a:rPr lang="en-GB" dirty="0"/>
+                        <a:t>Catch Diary (Catches)</a:t>
+                      </a:r>
+                    </a:p>
+                  </a:txBody>
+                  <a:tcPr/>
+                </a:tc>
+                <a:extLst>
+                  <a:ext uri="{0D108BD9-81ED-4DB2-BD59-A6C34878D82A}">
+                    <a16:rowId xmlns:a16="http://schemas.microsoft.com/office/drawing/2014/main" val="1422129240"/>
+                  </a:ext>
+                </a:extLst>
+              </a:tr>
+              <a:tr h="370840">
+                <a:tc>
+                  <a:txBody>
+                    <a:bodyPr/>
+                    <a:lstStyle/>
+                    <a:p>
+                      <a:pPr algn="ctr"/>
+                      <a:r>
+                        <a:rPr lang="en-GB" dirty="0"/>
+                        <a:t>CATCH ID </a:t>
+                      </a:r>
+                      <a:r>
+                        <a:rPr lang="en-GB" dirty="0">
+                          <a:solidFill>
+                            <a:srgbClr val="FF0000"/>
+                          </a:solidFill>
+                        </a:rPr>
+                        <a:t>PK</a:t>
+                      </a:r>
+                    </a:p>
+                  </a:txBody>
+                  <a:tcPr/>
+                </a:tc>
+                <a:extLst>
+                  <a:ext uri="{0D108BD9-81ED-4DB2-BD59-A6C34878D82A}">
+                    <a16:rowId xmlns:a16="http://schemas.microsoft.com/office/drawing/2014/main" val="1188494543"/>
+                  </a:ext>
+                </a:extLst>
+              </a:tr>
+              <a:tr h="370840">
+                <a:tc>
+                  <a:txBody>
+                    <a:bodyPr/>
+                    <a:lstStyle/>
+                    <a:p>
+                      <a:pPr algn="ctr"/>
+                      <a:r>
+                        <a:rPr lang="en-GB" dirty="0"/>
+                        <a:t>USER ID </a:t>
+                      </a:r>
+                      <a:r>
+                        <a:rPr lang="en-GB" dirty="0">
+                          <a:solidFill>
+                            <a:srgbClr val="FF0000"/>
+                          </a:solidFill>
+                        </a:rPr>
+                        <a:t>FK</a:t>
+                      </a:r>
+                    </a:p>
+                  </a:txBody>
+                  <a:tcPr/>
+                </a:tc>
+                <a:extLst>
+                  <a:ext uri="{0D108BD9-81ED-4DB2-BD59-A6C34878D82A}">
+                    <a16:rowId xmlns:a16="http://schemas.microsoft.com/office/drawing/2014/main" val="3216325975"/>
+                  </a:ext>
+                </a:extLst>
+              </a:tr>
+              <a:tr h="370840">
+                <a:tc>
+                  <a:txBody>
+                    <a:bodyPr/>
+                    <a:lstStyle/>
+                    <a:p>
+                      <a:pPr algn="ctr"/>
+                      <a:r>
+                        <a:rPr lang="en-GB" dirty="0"/>
+                        <a:t>USERNAME</a:t>
+                      </a:r>
+                    </a:p>
+                  </a:txBody>
+                  <a:tcPr/>
+                </a:tc>
+                <a:extLst>
+                  <a:ext uri="{0D108BD9-81ED-4DB2-BD59-A6C34878D82A}">
+                    <a16:rowId xmlns:a16="http://schemas.microsoft.com/office/drawing/2014/main" val="1097292389"/>
+                  </a:ext>
+                </a:extLst>
+              </a:tr>
+              <a:tr h="370840">
+                <a:tc>
+                  <a:txBody>
+                    <a:bodyPr/>
+                    <a:lstStyle/>
+                    <a:p>
+                      <a:pPr algn="ctr"/>
+                      <a:r>
+                        <a:rPr lang="en-GB" dirty="0"/>
+                        <a:t>FISH NAME/SPECIES (ID) </a:t>
+                      </a:r>
+                      <a:r>
+                        <a:rPr lang="en-GB" dirty="0">
+                          <a:solidFill>
+                            <a:srgbClr val="FF0000"/>
+                          </a:solidFill>
+                        </a:rPr>
+                        <a:t>FK</a:t>
+                      </a:r>
+                    </a:p>
+                  </a:txBody>
+                  <a:tcPr/>
+                </a:tc>
+                <a:extLst>
+                  <a:ext uri="{0D108BD9-81ED-4DB2-BD59-A6C34878D82A}">
+                    <a16:rowId xmlns:a16="http://schemas.microsoft.com/office/drawing/2014/main" val="3595484442"/>
+                  </a:ext>
+                </a:extLst>
+              </a:tr>
+              <a:tr h="370840">
+                <a:tc>
+                  <a:txBody>
+                    <a:bodyPr/>
+                    <a:lstStyle/>
+                    <a:p>
+                      <a:pPr algn="ctr"/>
+                      <a:r>
+                        <a:rPr lang="en-GB" dirty="0"/>
+                        <a:t>FISH WEIGHT</a:t>
+                      </a:r>
+                    </a:p>
+                  </a:txBody>
+                  <a:tcPr/>
+                </a:tc>
+                <a:extLst>
+                  <a:ext uri="{0D108BD9-81ED-4DB2-BD59-A6C34878D82A}">
+                    <a16:rowId xmlns:a16="http://schemas.microsoft.com/office/drawing/2014/main" val="397360109"/>
+                  </a:ext>
+                </a:extLst>
+              </a:tr>
+              <a:tr h="370840">
+                <a:tc>
+                  <a:txBody>
+                    <a:bodyPr/>
+                    <a:lstStyle/>
+                    <a:p>
+                      <a:pPr algn="ctr"/>
+                      <a:r>
+                        <a:rPr lang="en-GB" dirty="0"/>
+                        <a:t>FISH LENGTH</a:t>
+                      </a:r>
+                    </a:p>
+                  </a:txBody>
+                  <a:tcPr/>
+                </a:tc>
+                <a:extLst>
+                  <a:ext uri="{0D108BD9-81ED-4DB2-BD59-A6C34878D82A}">
+                    <a16:rowId xmlns:a16="http://schemas.microsoft.com/office/drawing/2014/main" val="91843410"/>
+                  </a:ext>
+                </a:extLst>
+              </a:tr>
+              <a:tr h="370840">
+                <a:tc>
+                  <a:txBody>
+                    <a:bodyPr/>
+                    <a:lstStyle/>
+                    <a:p>
+                      <a:pPr algn="ctr"/>
+                      <a:r>
+                        <a:rPr lang="en-GB" dirty="0"/>
+                        <a:t>LOCATION OF THE FISH</a:t>
+                      </a:r>
+                    </a:p>
+                  </a:txBody>
+                  <a:tcPr/>
+                </a:tc>
+                <a:extLst>
+                  <a:ext uri="{0D108BD9-81ED-4DB2-BD59-A6C34878D82A}">
+                    <a16:rowId xmlns:a16="http://schemas.microsoft.com/office/drawing/2014/main" val="1143153181"/>
+                  </a:ext>
+                </a:extLst>
+              </a:tr>
+              <a:tr h="370840">
+                <a:tc>
+                  <a:txBody>
+                    <a:bodyPr/>
+                    <a:lstStyle/>
+                    <a:p>
+                      <a:pPr algn="ctr"/>
+                      <a:r>
+                        <a:rPr lang="en-GB" dirty="0"/>
+                        <a:t>TIME TO CATCH FISH</a:t>
+                      </a:r>
+                    </a:p>
+                  </a:txBody>
+                  <a:tcPr/>
+                </a:tc>
+                <a:extLst>
+                  <a:ext uri="{0D108BD9-81ED-4DB2-BD59-A6C34878D82A}">
+                    <a16:rowId xmlns:a16="http://schemas.microsoft.com/office/drawing/2014/main" val="4224902186"/>
+                  </a:ext>
+                </a:extLst>
+              </a:tr>
+              <a:tr h="370840">
+                <a:tc>
+                  <a:txBody>
+                    <a:bodyPr/>
+                    <a:lstStyle/>
+                    <a:p>
+                      <a:pPr algn="ctr"/>
+                      <a:r>
+                        <a:rPr lang="en-GB" dirty="0"/>
+                        <a:t>DATE OF CATCH</a:t>
+                      </a:r>
+                    </a:p>
+                  </a:txBody>
+                  <a:tcPr/>
+                </a:tc>
+                <a:extLst>
+                  <a:ext uri="{0D108BD9-81ED-4DB2-BD59-A6C34878D82A}">
+                    <a16:rowId xmlns:a16="http://schemas.microsoft.com/office/drawing/2014/main" val="1785862042"/>
+                  </a:ext>
+                </a:extLst>
+              </a:tr>
+              <a:tr h="370840">
+                <a:tc>
+                  <a:txBody>
+                    <a:bodyPr/>
+                    <a:lstStyle/>
+                    <a:p>
+                      <a:pPr algn="ctr"/>
+                      <a:r>
+                        <a:rPr lang="en-GB" dirty="0"/>
+                        <a:t>WEATHER*</a:t>
+                      </a:r>
+                    </a:p>
+                  </a:txBody>
+                  <a:tcPr/>
+                </a:tc>
+                <a:extLst>
+                  <a:ext uri="{0D108BD9-81ED-4DB2-BD59-A6C34878D82A}">
+                    <a16:rowId xmlns:a16="http://schemas.microsoft.com/office/drawing/2014/main" val="3174600460"/>
+                  </a:ext>
+                </a:extLst>
+              </a:tr>
+              <a:tr h="370840">
+                <a:tc>
+                  <a:txBody>
+                    <a:bodyPr/>
+                    <a:lstStyle/>
+                    <a:p>
+                      <a:pPr algn="ctr"/>
+                      <a:r>
+                        <a:rPr lang="en-GB" dirty="0"/>
+                        <a:t>CATCH DESCRIPTION*</a:t>
+                      </a:r>
+                    </a:p>
+                  </a:txBody>
+                  <a:tcPr/>
+                </a:tc>
+                <a:extLst>
+                  <a:ext uri="{0D108BD9-81ED-4DB2-BD59-A6C34878D82A}">
+                    <a16:rowId xmlns:a16="http://schemas.microsoft.com/office/drawing/2014/main" val="610548736"/>
+                  </a:ext>
+                </a:extLst>
+              </a:tr>
+            </a:tbl>
+          </a:graphicData>
+        </a:graphic>
+      </p:graphicFrame>
+      <p:graphicFrame>
+        <p:nvGraphicFramePr>
+          <p:cNvPr id="12" name="Table 9">
+            <a:extLst>
+              <a:ext uri="{FF2B5EF4-FFF2-40B4-BE49-F238E27FC236}">
+                <a16:creationId xmlns:a16="http://schemas.microsoft.com/office/drawing/2014/main" id="{D0B121FD-3272-42B8-965B-E061D0EF43A1}"/>
+              </a:ext>
+            </a:extLst>
+          </p:cNvPr>
+          <p:cNvGraphicFramePr>
+            <a:graphicFrameLocks noGrp="1"/>
+          </p:cNvGraphicFramePr>
+          <p:nvPr>
+            <p:extLst>
+              <p:ext uri="{D42A27DB-BD31-4B8C-83A1-F6EECF244321}">
+                <p14:modId xmlns:p14="http://schemas.microsoft.com/office/powerpoint/2010/main" val="3732822421"/>
+              </p:ext>
+            </p:extLst>
+          </p:nvPr>
+        </p:nvGraphicFramePr>
+        <p:xfrm>
+          <a:off x="9186538" y="321144"/>
+          <a:ext cx="2581392" cy="5933440"/>
+        </p:xfrm>
+        <a:graphic>
+          <a:graphicData uri="http://schemas.openxmlformats.org/drawingml/2006/table">
+            <a:tbl>
+              <a:tblPr firstRow="1" bandRow="1">
+                <a:tableStyleId>{073A0DAA-6AF3-43AB-8588-CEC1D06C72B9}</a:tableStyleId>
+              </a:tblPr>
+              <a:tblGrid>
+                <a:gridCol w="2581392">
+                  <a:extLst>
+                    <a:ext uri="{9D8B030D-6E8A-4147-A177-3AD203B41FA5}">
+                      <a16:colId xmlns:a16="http://schemas.microsoft.com/office/drawing/2014/main" val="1286531651"/>
+                    </a:ext>
+                  </a:extLst>
+                </a:gridCol>
+              </a:tblGrid>
+              <a:tr h="370840">
+                <a:tc>
+                  <a:txBody>
+                    <a:bodyPr/>
+                    <a:lstStyle/>
+                    <a:p>
+                      <a:pPr algn="ctr"/>
+                      <a:r>
+                        <a:rPr lang="en-GB" dirty="0"/>
+                        <a:t>FISH</a:t>
+                      </a:r>
+                    </a:p>
+                  </a:txBody>
+                  <a:tcPr/>
+                </a:tc>
+                <a:extLst>
+                  <a:ext uri="{0D108BD9-81ED-4DB2-BD59-A6C34878D82A}">
+                    <a16:rowId xmlns:a16="http://schemas.microsoft.com/office/drawing/2014/main" val="1422129240"/>
+                  </a:ext>
+                </a:extLst>
+              </a:tr>
+              <a:tr h="370840">
+                <a:tc>
+                  <a:txBody>
+                    <a:bodyPr/>
+                    <a:lstStyle/>
+                    <a:p>
+                      <a:pPr algn="ctr"/>
+                      <a:r>
+                        <a:rPr lang="en-GB" sz="1600" dirty="0"/>
+                        <a:t>NAME/SPECIES (ID) </a:t>
+                      </a:r>
+                      <a:r>
+                        <a:rPr lang="en-GB" sz="1600" dirty="0">
+                          <a:solidFill>
+                            <a:srgbClr val="FF0000"/>
+                          </a:solidFill>
+                        </a:rPr>
+                        <a:t>PK</a:t>
+                      </a:r>
+                    </a:p>
+                  </a:txBody>
+                  <a:tcPr/>
+                </a:tc>
+                <a:extLst>
+                  <a:ext uri="{0D108BD9-81ED-4DB2-BD59-A6C34878D82A}">
+                    <a16:rowId xmlns:a16="http://schemas.microsoft.com/office/drawing/2014/main" val="1188494543"/>
+                  </a:ext>
+                </a:extLst>
+              </a:tr>
+              <a:tr h="370840">
+                <a:tc>
+                  <a:txBody>
+                    <a:bodyPr/>
+                    <a:lstStyle/>
+                    <a:p>
+                      <a:pPr algn="ctr"/>
+                      <a:r>
+                        <a:rPr lang="en-GB" sz="1600" dirty="0"/>
+                        <a:t>Min Weight</a:t>
+                      </a:r>
+                    </a:p>
+                  </a:txBody>
+                  <a:tcPr/>
+                </a:tc>
+                <a:extLst>
+                  <a:ext uri="{0D108BD9-81ED-4DB2-BD59-A6C34878D82A}">
+                    <a16:rowId xmlns:a16="http://schemas.microsoft.com/office/drawing/2014/main" val="3216325975"/>
+                  </a:ext>
+                </a:extLst>
+              </a:tr>
+              <a:tr h="370840">
+                <a:tc>
+                  <a:txBody>
+                    <a:bodyPr/>
+                    <a:lstStyle/>
+                    <a:p>
+                      <a:pPr algn="ctr"/>
+                      <a:r>
+                        <a:rPr lang="en-GB" sz="1600" dirty="0"/>
+                        <a:t>Max Weight</a:t>
+                      </a:r>
+                    </a:p>
+                  </a:txBody>
+                  <a:tcPr/>
+                </a:tc>
+                <a:extLst>
+                  <a:ext uri="{0D108BD9-81ED-4DB2-BD59-A6C34878D82A}">
+                    <a16:rowId xmlns:a16="http://schemas.microsoft.com/office/drawing/2014/main" val="1097292389"/>
+                  </a:ext>
+                </a:extLst>
+              </a:tr>
+              <a:tr h="370840">
+                <a:tc>
+                  <a:txBody>
+                    <a:bodyPr/>
+                    <a:lstStyle/>
+                    <a:p>
+                      <a:pPr algn="ctr"/>
+                      <a:r>
+                        <a:rPr lang="en-GB" sz="1600" dirty="0"/>
+                        <a:t>Avg. Weight</a:t>
+                      </a:r>
+                    </a:p>
+                  </a:txBody>
+                  <a:tcPr/>
+                </a:tc>
+                <a:extLst>
+                  <a:ext uri="{0D108BD9-81ED-4DB2-BD59-A6C34878D82A}">
+                    <a16:rowId xmlns:a16="http://schemas.microsoft.com/office/drawing/2014/main" val="3595484442"/>
+                  </a:ext>
+                </a:extLst>
+              </a:tr>
+              <a:tr h="370840">
+                <a:tc>
+                  <a:txBody>
+                    <a:bodyPr/>
+                    <a:lstStyle/>
+                    <a:p>
+                      <a:pPr algn="ctr"/>
+                      <a:r>
+                        <a:rPr lang="en-GB" sz="1600" dirty="0"/>
+                        <a:t>Min Length</a:t>
+                      </a:r>
+                    </a:p>
+                  </a:txBody>
+                  <a:tcPr/>
+                </a:tc>
+                <a:extLst>
+                  <a:ext uri="{0D108BD9-81ED-4DB2-BD59-A6C34878D82A}">
+                    <a16:rowId xmlns:a16="http://schemas.microsoft.com/office/drawing/2014/main" val="397360109"/>
+                  </a:ext>
+                </a:extLst>
+              </a:tr>
+              <a:tr h="370840">
+                <a:tc>
+                  <a:txBody>
+                    <a:bodyPr/>
+                    <a:lstStyle/>
+                    <a:p>
+                      <a:pPr algn="ctr"/>
+                      <a:r>
+                        <a:rPr lang="en-GB" sz="1600" dirty="0"/>
+                        <a:t>Max Length</a:t>
+                      </a:r>
+                    </a:p>
+                  </a:txBody>
+                  <a:tcPr/>
+                </a:tc>
+                <a:extLst>
+                  <a:ext uri="{0D108BD9-81ED-4DB2-BD59-A6C34878D82A}">
+                    <a16:rowId xmlns:a16="http://schemas.microsoft.com/office/drawing/2014/main" val="91843410"/>
+                  </a:ext>
+                </a:extLst>
+              </a:tr>
+              <a:tr h="370840">
+                <a:tc>
+                  <a:txBody>
+                    <a:bodyPr/>
+                    <a:lstStyle/>
+                    <a:p>
+                      <a:pPr algn="ctr"/>
+                      <a:r>
+                        <a:rPr lang="en-GB" sz="1600" dirty="0"/>
+                        <a:t>Avg. Length</a:t>
+                      </a:r>
+                    </a:p>
+                  </a:txBody>
+                  <a:tcPr/>
+                </a:tc>
+                <a:extLst>
+                  <a:ext uri="{0D108BD9-81ED-4DB2-BD59-A6C34878D82A}">
+                    <a16:rowId xmlns:a16="http://schemas.microsoft.com/office/drawing/2014/main" val="1143153181"/>
+                  </a:ext>
+                </a:extLst>
+              </a:tr>
+              <a:tr h="370840">
+                <a:tc>
+                  <a:txBody>
+                    <a:bodyPr/>
+                    <a:lstStyle/>
+                    <a:p>
+                      <a:pPr algn="ctr"/>
+                      <a:r>
+                        <a:rPr lang="en-GB" sz="1600" dirty="0"/>
+                        <a:t>Total Min</a:t>
+                      </a:r>
+                    </a:p>
+                  </a:txBody>
+                  <a:tcPr/>
+                </a:tc>
+                <a:extLst>
+                  <a:ext uri="{0D108BD9-81ED-4DB2-BD59-A6C34878D82A}">
+                    <a16:rowId xmlns:a16="http://schemas.microsoft.com/office/drawing/2014/main" val="3506196410"/>
+                  </a:ext>
+                </a:extLst>
+              </a:tr>
+              <a:tr h="370840">
+                <a:tc>
+                  <a:txBody>
+                    <a:bodyPr/>
+                    <a:lstStyle/>
+                    <a:p>
+                      <a:pPr algn="ctr"/>
+                      <a:r>
+                        <a:rPr lang="en-GB" sz="1600" dirty="0"/>
+                        <a:t>Total Max</a:t>
+                      </a:r>
+                    </a:p>
+                  </a:txBody>
+                  <a:tcPr/>
+                </a:tc>
+                <a:extLst>
+                  <a:ext uri="{0D108BD9-81ED-4DB2-BD59-A6C34878D82A}">
+                    <a16:rowId xmlns:a16="http://schemas.microsoft.com/office/drawing/2014/main" val="4104921534"/>
+                  </a:ext>
+                </a:extLst>
+              </a:tr>
+              <a:tr h="370840">
+                <a:tc>
+                  <a:txBody>
+                    <a:bodyPr/>
+                    <a:lstStyle/>
+                    <a:p>
+                      <a:pPr algn="ctr"/>
+                      <a:r>
+                        <a:rPr lang="en-GB" sz="1600" dirty="0"/>
+                        <a:t>User with Min L </a:t>
+                      </a:r>
+                      <a:r>
+                        <a:rPr lang="en-GB" sz="1600" dirty="0">
+                          <a:solidFill>
+                            <a:srgbClr val="FF0000"/>
+                          </a:solidFill>
+                        </a:rPr>
+                        <a:t>FK</a:t>
+                      </a:r>
+                    </a:p>
+                  </a:txBody>
+                  <a:tcPr/>
+                </a:tc>
+                <a:extLst>
+                  <a:ext uri="{0D108BD9-81ED-4DB2-BD59-A6C34878D82A}">
+                    <a16:rowId xmlns:a16="http://schemas.microsoft.com/office/drawing/2014/main" val="4224902186"/>
+                  </a:ext>
+                </a:extLst>
+              </a:tr>
+              <a:tr h="370840">
+                <a:tc>
+                  <a:txBody>
+                    <a:bodyPr/>
+                    <a:lstStyle/>
+                    <a:p>
+                      <a:pPr algn="ctr"/>
+                      <a:r>
+                        <a:rPr lang="en-GB" sz="1600" dirty="0"/>
+                        <a:t>User with Max L </a:t>
+                      </a:r>
+                      <a:r>
+                        <a:rPr lang="en-GB" sz="1600" dirty="0">
+                          <a:solidFill>
+                            <a:srgbClr val="FF0000"/>
+                          </a:solidFill>
+                        </a:rPr>
+                        <a:t>FK</a:t>
+                      </a:r>
+                    </a:p>
+                  </a:txBody>
+                  <a:tcPr/>
+                </a:tc>
+                <a:extLst>
+                  <a:ext uri="{0D108BD9-81ED-4DB2-BD59-A6C34878D82A}">
+                    <a16:rowId xmlns:a16="http://schemas.microsoft.com/office/drawing/2014/main" val="2283318452"/>
+                  </a:ext>
+                </a:extLst>
+              </a:tr>
+              <a:tr h="370840">
+                <a:tc>
+                  <a:txBody>
+                    <a:bodyPr/>
+                    <a:lstStyle/>
+                    <a:p>
+                      <a:pPr algn="ctr"/>
+                      <a:r>
+                        <a:rPr lang="en-GB" sz="1600" dirty="0"/>
+                        <a:t>User with Min W </a:t>
+                      </a:r>
+                      <a:r>
+                        <a:rPr lang="en-GB" sz="1600" dirty="0">
+                          <a:solidFill>
+                            <a:srgbClr val="FF0000"/>
+                          </a:solidFill>
+                        </a:rPr>
+                        <a:t>FK</a:t>
+                      </a:r>
+                    </a:p>
+                  </a:txBody>
+                  <a:tcPr/>
+                </a:tc>
+                <a:extLst>
+                  <a:ext uri="{0D108BD9-81ED-4DB2-BD59-A6C34878D82A}">
+                    <a16:rowId xmlns:a16="http://schemas.microsoft.com/office/drawing/2014/main" val="3512233999"/>
+                  </a:ext>
+                </a:extLst>
+              </a:tr>
+              <a:tr h="370840">
+                <a:tc>
+                  <a:txBody>
+                    <a:bodyPr/>
+                    <a:lstStyle/>
+                    <a:p>
+                      <a:pPr algn="ctr"/>
+                      <a:r>
+                        <a:rPr lang="en-GB" sz="1600" dirty="0"/>
+                        <a:t>User with Max W </a:t>
+                      </a:r>
+                      <a:r>
+                        <a:rPr lang="en-GB" sz="1600" dirty="0">
+                          <a:solidFill>
+                            <a:srgbClr val="FF0000"/>
+                          </a:solidFill>
+                        </a:rPr>
+                        <a:t>FK</a:t>
+                      </a:r>
+                    </a:p>
+                  </a:txBody>
+                  <a:tcPr/>
+                </a:tc>
+                <a:extLst>
+                  <a:ext uri="{0D108BD9-81ED-4DB2-BD59-A6C34878D82A}">
+                    <a16:rowId xmlns:a16="http://schemas.microsoft.com/office/drawing/2014/main" val="1932957171"/>
+                  </a:ext>
+                </a:extLst>
+              </a:tr>
+              <a:tr h="370840">
+                <a:tc>
+                  <a:txBody>
+                    <a:bodyPr/>
+                    <a:lstStyle/>
+                    <a:p>
+                      <a:pPr algn="ctr"/>
+                      <a:r>
+                        <a:rPr lang="en-GB" sz="1600" dirty="0"/>
+                        <a:t>User with Min Total </a:t>
+                      </a:r>
+                      <a:r>
+                        <a:rPr lang="en-GB" sz="1600" dirty="0">
+                          <a:solidFill>
+                            <a:srgbClr val="FF0000"/>
+                          </a:solidFill>
+                        </a:rPr>
+                        <a:t>FK</a:t>
+                      </a:r>
+                    </a:p>
+                  </a:txBody>
+                  <a:tcPr/>
+                </a:tc>
+                <a:extLst>
+                  <a:ext uri="{0D108BD9-81ED-4DB2-BD59-A6C34878D82A}">
+                    <a16:rowId xmlns:a16="http://schemas.microsoft.com/office/drawing/2014/main" val="1875982952"/>
+                  </a:ext>
+                </a:extLst>
+              </a:tr>
+              <a:tr h="370840">
+                <a:tc>
+                  <a:txBody>
+                    <a:bodyPr/>
+                    <a:lstStyle/>
+                    <a:p>
+                      <a:pPr algn="ctr"/>
+                      <a:r>
+                        <a:rPr lang="en-GB" sz="1600" dirty="0"/>
+                        <a:t>User with Max Total </a:t>
+                      </a:r>
+                      <a:r>
+                        <a:rPr lang="en-GB" sz="1600" dirty="0">
+                          <a:solidFill>
+                            <a:srgbClr val="FF0000"/>
+                          </a:solidFill>
+                        </a:rPr>
+                        <a:t>FK</a:t>
+                      </a:r>
+                    </a:p>
+                  </a:txBody>
+                  <a:tcPr/>
+                </a:tc>
+                <a:extLst>
+                  <a:ext uri="{0D108BD9-81ED-4DB2-BD59-A6C34878D82A}">
+                    <a16:rowId xmlns:a16="http://schemas.microsoft.com/office/drawing/2014/main" val="2612132860"/>
+                  </a:ext>
+                </a:extLst>
+              </a:tr>
+            </a:tbl>
+          </a:graphicData>
+        </a:graphic>
+      </p:graphicFrame>
+      <p:graphicFrame>
+        <p:nvGraphicFramePr>
+          <p:cNvPr id="23" name="Table 23">
+            <a:extLst>
+              <a:ext uri="{FF2B5EF4-FFF2-40B4-BE49-F238E27FC236}">
+                <a16:creationId xmlns:a16="http://schemas.microsoft.com/office/drawing/2014/main" id="{9ABBE687-3DC3-4216-9195-7E0EEFD6E3B9}"/>
+              </a:ext>
+            </a:extLst>
+          </p:cNvPr>
+          <p:cNvGraphicFramePr>
+            <a:graphicFrameLocks noGrp="1"/>
+          </p:cNvGraphicFramePr>
+          <p:nvPr>
+            <p:extLst>
+              <p:ext uri="{D42A27DB-BD31-4B8C-83A1-F6EECF244321}">
+                <p14:modId xmlns:p14="http://schemas.microsoft.com/office/powerpoint/2010/main" val="3370448000"/>
+              </p:ext>
+            </p:extLst>
+          </p:nvPr>
+        </p:nvGraphicFramePr>
+        <p:xfrm>
+          <a:off x="164007" y="167982"/>
+          <a:ext cx="3195417" cy="1463040"/>
+        </p:xfrm>
+        <a:graphic>
+          <a:graphicData uri="http://schemas.openxmlformats.org/drawingml/2006/table">
+            <a:tbl>
+              <a:tblPr firstRow="1" bandRow="1">
+                <a:tableStyleId>{FABFCF23-3B69-468F-B69F-88F6DE6A72F2}</a:tableStyleId>
+              </a:tblPr>
+              <a:tblGrid>
+                <a:gridCol w="3195417">
+                  <a:extLst>
+                    <a:ext uri="{9D8B030D-6E8A-4147-A177-3AD203B41FA5}">
+                      <a16:colId xmlns:a16="http://schemas.microsoft.com/office/drawing/2014/main" val="4117664060"/>
+                    </a:ext>
+                  </a:extLst>
+                </a:gridCol>
+              </a:tblGrid>
+              <a:tr h="216131">
+                <a:tc>
+                  <a:txBody>
+                    <a:bodyPr/>
+                    <a:lstStyle/>
+                    <a:p>
+                      <a:pPr algn="ctr"/>
+                      <a:r>
+                        <a:rPr lang="en-GB" dirty="0"/>
+                        <a:t>Key</a:t>
+                      </a:r>
+                    </a:p>
+                  </a:txBody>
+                  <a:tcPr/>
+                </a:tc>
+                <a:extLst>
+                  <a:ext uri="{0D108BD9-81ED-4DB2-BD59-A6C34878D82A}">
+                    <a16:rowId xmlns:a16="http://schemas.microsoft.com/office/drawing/2014/main" val="1826022512"/>
+                  </a:ext>
+                </a:extLst>
+              </a:tr>
+              <a:tr h="216131">
+                <a:tc>
+                  <a:txBody>
+                    <a:bodyPr/>
+                    <a:lstStyle/>
+                    <a:p>
+                      <a:pPr algn="ctr"/>
+                      <a:r>
+                        <a:rPr lang="en-GB" dirty="0"/>
+                        <a:t>* - Optional Field</a:t>
+                      </a:r>
+                    </a:p>
+                  </a:txBody>
+                  <a:tcPr/>
+                </a:tc>
+                <a:extLst>
+                  <a:ext uri="{0D108BD9-81ED-4DB2-BD59-A6C34878D82A}">
+                    <a16:rowId xmlns:a16="http://schemas.microsoft.com/office/drawing/2014/main" val="1556045627"/>
+                  </a:ext>
+                </a:extLst>
+              </a:tr>
+              <a:tr h="216131">
+                <a:tc>
+                  <a:txBody>
+                    <a:bodyPr/>
+                    <a:lstStyle/>
+                    <a:p>
+                      <a:pPr algn="ctr"/>
+                      <a:r>
+                        <a:rPr lang="en-GB" dirty="0"/>
+                        <a:t>PK – Primary Key field</a:t>
+                      </a:r>
+                    </a:p>
+                  </a:txBody>
+                  <a:tcPr/>
+                </a:tc>
+                <a:extLst>
+                  <a:ext uri="{0D108BD9-81ED-4DB2-BD59-A6C34878D82A}">
+                    <a16:rowId xmlns:a16="http://schemas.microsoft.com/office/drawing/2014/main" val="3914975858"/>
+                  </a:ext>
+                </a:extLst>
+              </a:tr>
+              <a:tr h="216131">
+                <a:tc>
+                  <a:txBody>
+                    <a:bodyPr/>
+                    <a:lstStyle/>
+                    <a:p>
+                      <a:pPr algn="ctr"/>
+                      <a:r>
+                        <a:rPr lang="en-GB" dirty="0"/>
+                        <a:t>FK- Foreign Key field</a:t>
+                      </a:r>
+                    </a:p>
+                  </a:txBody>
+                  <a:tcPr/>
+                </a:tc>
+                <a:extLst>
+                  <a:ext uri="{0D108BD9-81ED-4DB2-BD59-A6C34878D82A}">
+                    <a16:rowId xmlns:a16="http://schemas.microsoft.com/office/drawing/2014/main" val="4235637454"/>
+                  </a:ext>
+                </a:extLst>
+              </a:tr>
+            </a:tbl>
+          </a:graphicData>
+        </a:graphic>
+      </p:graphicFrame>
+    </p:spTree>
+    <p:extLst>
+      <p:ext uri="{BB962C8B-B14F-4D97-AF65-F5344CB8AC3E}">
+        <p14:creationId xmlns:p14="http://schemas.microsoft.com/office/powerpoint/2010/main" val="1482063869"/>
+      </p:ext>
+    </p:extLst>
+  </p:cSld>
+  <p:clrMapOvr>
+    <a:masterClrMapping/>
+  </p:clrMapOvr>
+</p:sld>
+</file>
+
+<file path=ppt/slides/slide8.xml><?xml version="1.0" encoding="utf-8"?>
+<p:sld xmlns:a="http://schemas.openxmlformats.org/drawingml/2006/main" xmlns:r="http://schemas.openxmlformats.org/officeDocument/2006/relationships" xmlns:p="http://schemas.openxmlformats.org/presentationml/2006/main">
+  <p:cSld>
+    <p:spTree>
+      <p:nvGrpSpPr>
+        <p:cNvPr id="1" name=""/>
+        <p:cNvGrpSpPr/>
+        <p:nvPr/>
+      </p:nvGrpSpPr>
+      <p:grpSpPr>
+        <a:xfrm>
+          <a:off x="0" y="0"/>
+          <a:ext cx="0" cy="0"/>
+          <a:chOff x="0" y="0"/>
+          <a:chExt cx="0" cy="0"/>
+        </a:xfrm>
+      </p:grpSpPr>
+      <p:sp>
+        <p:nvSpPr>
+          <p:cNvPr id="4" name="Rectangle 3">
+            <a:extLst>
+              <a:ext uri="{FF2B5EF4-FFF2-40B4-BE49-F238E27FC236}">
+                <a16:creationId xmlns:a16="http://schemas.microsoft.com/office/drawing/2014/main" id="{3CA928CC-4F6D-452F-859D-81A271E06C31}"/>
+              </a:ext>
+            </a:extLst>
+          </p:cNvPr>
+          <p:cNvSpPr/>
+          <p:nvPr/>
+        </p:nvSpPr>
+        <p:spPr>
+          <a:xfrm>
+            <a:off x="1113905" y="4256116"/>
+            <a:ext cx="10523913" cy="1080655"/>
+          </a:xfrm>
+          <a:prstGeom prst="rect">
+            <a:avLst/>
+          </a:prstGeom>
+          <a:solidFill>
+            <a:schemeClr val="bg1"/>
+          </a:solidFill>
+          <a:ln>
+            <a:noFill/>
+          </a:ln>
+        </p:spPr>
+        <p:style>
+          <a:lnRef idx="2">
+            <a:schemeClr val="accent1">
+              <a:shade val="50000"/>
+            </a:schemeClr>
+          </a:lnRef>
+          <a:fillRef idx="1">
+            <a:schemeClr val="accent1"/>
+          </a:fillRef>
+          <a:effectRef idx="0">
+            <a:schemeClr val="accent1"/>
+          </a:effectRef>
+          <a:fontRef idx="minor">
+            <a:schemeClr val="lt1"/>
+          </a:fontRef>
+        </p:style>
+        <p:txBody>
+          <a:bodyPr rtlCol="0" anchor="ctr"/>
+          <a:lstStyle/>
+          <a:p>
+            <a:pPr algn="ctr"/>
+            <a:endParaRPr lang="en-GB"/>
+          </a:p>
+        </p:txBody>
+      </p:sp>
+      <p:sp>
+        <p:nvSpPr>
+          <p:cNvPr id="5" name="Title 1">
+            <a:extLst>
+              <a:ext uri="{FF2B5EF4-FFF2-40B4-BE49-F238E27FC236}">
+                <a16:creationId xmlns:a16="http://schemas.microsoft.com/office/drawing/2014/main" id="{8FCD082F-9185-45D1-BE3D-3BA3B999D152}"/>
+              </a:ext>
+            </a:extLst>
+          </p:cNvPr>
+          <p:cNvSpPr txBox="1">
+            <a:spLocks/>
+          </p:cNvSpPr>
+          <p:nvPr/>
+        </p:nvSpPr>
+        <p:spPr>
+          <a:xfrm>
+            <a:off x="0" y="-13252"/>
+            <a:ext cx="12192000" cy="980661"/>
+          </a:xfrm>
+          <a:prstGeom prst="rect">
+            <a:avLst/>
+          </a:prstGeom>
+        </p:spPr>
+        <p:txBody>
+          <a:bodyPr vert="horz" lIns="91440" tIns="45720" rIns="91440" bIns="45720" rtlCol="0" anchor="b">
+            <a:noAutofit/>
+          </a:bodyPr>
+          <a:lstStyle>
+            <a:lvl1pPr algn="l" defTabSz="914400" rtl="0" eaLnBrk="1" latinLnBrk="0" hangingPunct="1">
+              <a:lnSpc>
+                <a:spcPct val="90000"/>
+              </a:lnSpc>
+              <a:spcBef>
+                <a:spcPct val="0"/>
+              </a:spcBef>
+              <a:buNone/>
+              <a:defRPr sz="8000" kern="1200" spc="-50" baseline="0">
+                <a:solidFill>
+                  <a:schemeClr val="tx1">
+                    <a:lumMod val="85000"/>
+                    <a:lumOff val="15000"/>
+                  </a:schemeClr>
+                </a:solidFill>
+                <a:latin typeface="+mj-lt"/>
+                <a:ea typeface="+mj-ea"/>
+                <a:cs typeface="+mj-cs"/>
+              </a:defRPr>
+            </a:lvl1pPr>
+          </a:lstStyle>
+          <a:p>
+            <a:pPr algn="ctr"/>
+            <a:r>
+              <a:rPr lang="en-GB" sz="5400" dirty="0"/>
+              <a:t>Idea- Cont.</a:t>
+            </a:r>
+          </a:p>
+        </p:txBody>
+      </p:sp>
+      <p:sp>
+        <p:nvSpPr>
+          <p:cNvPr id="7" name="TextBox 6">
+            <a:extLst>
+              <a:ext uri="{FF2B5EF4-FFF2-40B4-BE49-F238E27FC236}">
+                <a16:creationId xmlns:a16="http://schemas.microsoft.com/office/drawing/2014/main" id="{2ED44EBE-58D7-4E7E-A108-E83656928278}"/>
+              </a:ext>
+            </a:extLst>
+          </p:cNvPr>
+          <p:cNvSpPr txBox="1"/>
+          <p:nvPr/>
+        </p:nvSpPr>
+        <p:spPr>
+          <a:xfrm>
+            <a:off x="3359424" y="957400"/>
+            <a:ext cx="5473148" cy="523220"/>
+          </a:xfrm>
+          <a:prstGeom prst="rect">
+            <a:avLst/>
+          </a:prstGeom>
+          <a:noFill/>
+        </p:spPr>
+        <p:txBody>
+          <a:bodyPr wrap="square" rtlCol="0">
+            <a:spAutoFit/>
+          </a:bodyPr>
+          <a:lstStyle/>
+          <a:p>
+            <a:pPr algn="ctr"/>
+            <a:r>
+              <a:rPr lang="en-GB" sz="2800" u="sng" dirty="0"/>
+              <a:t>Potential User Journey Map/ Process</a:t>
+            </a:r>
+            <a:endParaRPr lang="en-GB" u="sng" dirty="0"/>
+          </a:p>
+        </p:txBody>
+      </p:sp>
+      <p:sp>
+        <p:nvSpPr>
+          <p:cNvPr id="8" name="TextBox 7">
+            <a:extLst>
+              <a:ext uri="{FF2B5EF4-FFF2-40B4-BE49-F238E27FC236}">
+                <a16:creationId xmlns:a16="http://schemas.microsoft.com/office/drawing/2014/main" id="{D4CECEF3-39F8-4FE8-A8B4-FEAA11DF201C}"/>
+              </a:ext>
+            </a:extLst>
+          </p:cNvPr>
+          <p:cNvSpPr txBox="1"/>
+          <p:nvPr/>
+        </p:nvSpPr>
+        <p:spPr>
+          <a:xfrm>
+            <a:off x="1149925" y="1631036"/>
+            <a:ext cx="10074666" cy="4524315"/>
+          </a:xfrm>
+          <a:prstGeom prst="rect">
+            <a:avLst/>
+          </a:prstGeom>
+          <a:noFill/>
+        </p:spPr>
+        <p:txBody>
+          <a:bodyPr wrap="square" rtlCol="0">
+            <a:spAutoFit/>
+          </a:bodyPr>
+          <a:lstStyle/>
+          <a:p>
+            <a:pPr marL="342900" indent="-342900">
+              <a:buFont typeface="+mj-lt"/>
+              <a:buAutoNum type="arabicPeriod"/>
+            </a:pPr>
+            <a:r>
+              <a:rPr lang="en-GB" sz="1600" dirty="0"/>
+              <a:t>User catches fish at sea/ fishing spot</a:t>
+            </a:r>
+          </a:p>
+          <a:p>
+            <a:pPr marL="342900" indent="-342900">
+              <a:buFont typeface="+mj-lt"/>
+              <a:buAutoNum type="arabicPeriod"/>
+            </a:pPr>
+            <a:r>
+              <a:rPr lang="en-GB" sz="1600" dirty="0"/>
+              <a:t>User registers on web app.</a:t>
+            </a:r>
+          </a:p>
+          <a:p>
+            <a:pPr marL="342900" indent="-342900">
+              <a:buFont typeface="+mj-lt"/>
+              <a:buAutoNum type="arabicPeriod"/>
+            </a:pPr>
+            <a:r>
+              <a:rPr lang="en-GB" sz="1600" dirty="0"/>
+              <a:t>User Logs in using registered username and password </a:t>
+            </a:r>
+            <a:r>
+              <a:rPr lang="en-GB" sz="1600" dirty="0">
+                <a:solidFill>
+                  <a:srgbClr val="FF0000"/>
+                </a:solidFill>
+              </a:rPr>
+              <a:t>–</a:t>
+            </a:r>
+            <a:r>
+              <a:rPr lang="en-GB" sz="1600" dirty="0"/>
+              <a:t> Application shows their personalised profile.</a:t>
+            </a:r>
+          </a:p>
+          <a:p>
+            <a:pPr marL="342900" indent="-342900">
+              <a:buFont typeface="+mj-lt"/>
+              <a:buAutoNum type="arabicPeriod"/>
+            </a:pPr>
+            <a:r>
+              <a:rPr lang="en-GB" sz="1600" dirty="0"/>
+              <a:t>User navigates to “catches” enters “new catch” containing all relevant information, with the species name/id, length, weight, location, date of catch, time to catch, with optional descriptive fields available if the user feels it is necessary to input such data. User ID, Username are taken from User profile, While Catch ID is automatically generated, likely with an e-numerator process. </a:t>
+            </a:r>
+          </a:p>
+          <a:p>
+            <a:r>
+              <a:rPr lang="en-GB" sz="1600" dirty="0"/>
+              <a:t>	4a Compute process </a:t>
+            </a:r>
+            <a:r>
+              <a:rPr lang="en-GB" sz="1600" dirty="0">
+                <a:solidFill>
+                  <a:srgbClr val="FF0000"/>
+                </a:solidFill>
+              </a:rPr>
+              <a:t>- </a:t>
+            </a:r>
+            <a:r>
+              <a:rPr lang="en-GB" sz="1600" dirty="0"/>
+              <a:t>Fish species, Length and Weight are taken from the new catch and compared to the 	fish dictionary, if the total beats the previous total (calculated from length * weight of the fish) it is 	registered as a top catch and the username/user ID are attributed(FOR THAT SPECIFIC FISH ID) In both 	the Top catch ID of the catch diary, and the min/max/total values within the fish table.</a:t>
+            </a:r>
+          </a:p>
+          <a:p>
+            <a:endParaRPr lang="en-GB" sz="1600" dirty="0"/>
+          </a:p>
+          <a:p>
+            <a:pPr marL="342900" indent="-342900">
+              <a:buFont typeface="+mj-lt"/>
+              <a:buAutoNum type="arabicPeriod" startAt="5"/>
+            </a:pPr>
+            <a:r>
+              <a:rPr lang="en-GB" sz="1600" dirty="0"/>
+              <a:t>User wishes to view their various catches </a:t>
+            </a:r>
+            <a:r>
+              <a:rPr lang="en-GB" sz="1600" dirty="0">
+                <a:solidFill>
+                  <a:srgbClr val="FF0000"/>
+                </a:solidFill>
+              </a:rPr>
+              <a:t>–</a:t>
+            </a:r>
+            <a:r>
+              <a:rPr lang="en-GB" sz="1600" dirty="0"/>
+              <a:t> Read the catch diary and retrieve all catches that are linked to their specific username. The Top catch within the user profile is their personal Top catch.</a:t>
+            </a:r>
+          </a:p>
+          <a:p>
+            <a:pPr marL="342900" indent="-342900">
+              <a:buFont typeface="+mj-lt"/>
+              <a:buAutoNum type="arabicPeriod" startAt="5"/>
+            </a:pPr>
+            <a:r>
+              <a:rPr lang="en-GB" sz="1600" dirty="0"/>
+              <a:t>User wishes to delete one of their less worthy catches </a:t>
+            </a:r>
+            <a:r>
+              <a:rPr lang="en-GB" sz="1600" dirty="0">
+                <a:solidFill>
+                  <a:srgbClr val="FF0000"/>
+                </a:solidFill>
+              </a:rPr>
+              <a:t>- </a:t>
+            </a:r>
+            <a:r>
+              <a:rPr lang="en-GB" sz="1600" dirty="0"/>
+              <a:t> User reads the catch Diary and deletes their very first Catch. Catch is completely wiped from the database, all other catch ID’s likely update to one less, if the catch contained a value that was the min or max of a specific fish, those values are deleted and replaced with the one that was just below it.</a:t>
+            </a:r>
+          </a:p>
+        </p:txBody>
+      </p:sp>
+    </p:spTree>
+    <p:extLst>
+      <p:ext uri="{BB962C8B-B14F-4D97-AF65-F5344CB8AC3E}">
+        <p14:creationId xmlns:p14="http://schemas.microsoft.com/office/powerpoint/2010/main" val="4059953925"/>
+      </p:ext>
+    </p:extLst>
+  </p:cSld>
+  <p:clrMapOvr>
+    <a:masterClrMapping/>
+  </p:clrMapOvr>
+</p:sld>
+</file>
+
+<file path=ppt/slides/slide9.xml><?xml version="1.0" encoding="utf-8"?>
+<p:sld xmlns:a="http://schemas.openxmlformats.org/drawingml/2006/main" xmlns:r="http://schemas.openxmlformats.org/officeDocument/2006/relationships" xmlns:p="http://schemas.openxmlformats.org/presentationml/2006/main">
+  <p:cSld>
+    <p:spTree>
+      <p:nvGrpSpPr>
+        <p:cNvPr id="1" name=""/>
+        <p:cNvGrpSpPr/>
+        <p:nvPr/>
+      </p:nvGrpSpPr>
+      <p:grpSpPr>
+        <a:xfrm>
+          <a:off x="0" y="0"/>
+          <a:ext cx="0" cy="0"/>
+          <a:chOff x="0" y="0"/>
+          <a:chExt cx="0" cy="0"/>
+        </a:xfrm>
+      </p:grpSpPr>
+      <p:sp>
+        <p:nvSpPr>
+          <p:cNvPr id="2" name="Title 1">
+            <a:extLst>
+              <a:ext uri="{FF2B5EF4-FFF2-40B4-BE49-F238E27FC236}">
+                <a16:creationId xmlns:a16="http://schemas.microsoft.com/office/drawing/2014/main" id="{7E08EC77-2C05-4382-AF43-5894FFDF018E}"/>
+              </a:ext>
+            </a:extLst>
+          </p:cNvPr>
+          <p:cNvSpPr>
+            <a:spLocks noGrp="1"/>
+          </p:cNvSpPr>
+          <p:nvPr>
+            <p:ph type="ctrTitle"/>
+          </p:nvPr>
+        </p:nvSpPr>
+        <p:spPr/>
+        <p:txBody>
+          <a:bodyPr/>
+          <a:lstStyle/>
+          <a:p>
+            <a:endParaRPr lang="en-GB"/>
+          </a:p>
+        </p:txBody>
+      </p:sp>
+      <p:sp>
+        <p:nvSpPr>
+          <p:cNvPr id="3" name="Subtitle 2">
+            <a:extLst>
+              <a:ext uri="{FF2B5EF4-FFF2-40B4-BE49-F238E27FC236}">
+                <a16:creationId xmlns:a16="http://schemas.microsoft.com/office/drawing/2014/main" id="{822BB475-09CE-4D7C-9D28-59FAF19A66A8}"/>
+              </a:ext>
+            </a:extLst>
+          </p:cNvPr>
+          <p:cNvSpPr>
+            <a:spLocks noGrp="1"/>
+          </p:cNvSpPr>
+          <p:nvPr>
+            <p:ph type="subTitle" idx="1"/>
+          </p:nvPr>
+        </p:nvSpPr>
+        <p:spPr/>
+        <p:txBody>
+          <a:bodyPr/>
+          <a:lstStyle/>
+          <a:p>
+            <a:endParaRPr lang="en-GB"/>
+          </a:p>
+        </p:txBody>
+      </p:sp>
+    </p:spTree>
+    <p:extLst>
+      <p:ext uri="{BB962C8B-B14F-4D97-AF65-F5344CB8AC3E}">
+        <p14:creationId xmlns:p14="http://schemas.microsoft.com/office/powerpoint/2010/main" val="2624119646"/>
       </p:ext>
     </p:extLst>
   </p:cSld>

</xml_diff>